<commit_message>
pilot analysis & materials of exp2
</commit_message>
<xml_diff>
--- a/4_Reports/2026_伍嘉琪_开题答辩_v2.pptx
+++ b/4_Reports/2026_伍嘉琪_开题答辩_v2.pptx
@@ -243,7 +243,7 @@
           <a:p>
             <a:fld id="{4198D4DD-46D5-4956-9054-BEF2F97ABAB0}" type="datetimeFigureOut">
               <a:rPr lang="zh-CN" altLang="en-US" smtClean="0"/>
-              <a:t>2025/3/14</a:t>
+              <a:t>2025/3/26</a:t>
             </a:fld>
             <a:endParaRPr lang="zh-CN" altLang="en-US"/>
           </a:p>
@@ -3335,7 +3335,7 @@
           <a:p>
             <a:fld id="{760FBDFE-C587-4B4C-A407-44438C67B59E}" type="datetimeFigureOut">
               <a:rPr lang="zh-CN" altLang="en-US" smtClean="0"/>
-              <a:t>2025/3/14</a:t>
+              <a:t>2025/3/26</a:t>
             </a:fld>
             <a:endParaRPr lang="zh-CN" altLang="en-US"/>
           </a:p>
@@ -3434,7 +3434,7 @@
           <a:p>
             <a:fld id="{760FBDFE-C587-4B4C-A407-44438C67B59E}" type="datetimeFigureOut">
               <a:rPr lang="zh-CN" altLang="en-US" smtClean="0"/>
-              <a:t>2025/3/14</a:t>
+              <a:t>2025/3/26</a:t>
             </a:fld>
             <a:endParaRPr lang="zh-CN" altLang="en-US"/>
           </a:p>
@@ -3592,7 +3592,7 @@
           <a:p>
             <a:fld id="{760FBDFE-C587-4B4C-A407-44438C67B59E}" type="datetimeFigureOut">
               <a:rPr lang="zh-CN" altLang="en-US" smtClean="0"/>
-              <a:t>2025/3/14</a:t>
+              <a:t>2025/3/26</a:t>
             </a:fld>
             <a:endParaRPr lang="zh-CN" altLang="en-US"/>
           </a:p>
@@ -3863,7 +3863,7 @@
           <a:p>
             <a:fld id="{760FBDFE-C587-4B4C-A407-44438C67B59E}" type="datetimeFigureOut">
               <a:rPr lang="zh-CN" altLang="en-US" smtClean="0"/>
-              <a:t>2025/3/14</a:t>
+              <a:t>2025/3/26</a:t>
             </a:fld>
             <a:endParaRPr lang="zh-CN" altLang="en-US"/>
           </a:p>
@@ -4123,7 +4123,7 @@
           <a:p>
             <a:fld id="{760FBDFE-C587-4B4C-A407-44438C67B59E}" type="datetimeFigureOut">
               <a:rPr lang="zh-CN" altLang="en-US" smtClean="0"/>
-              <a:t>2025/3/14</a:t>
+              <a:t>2025/3/26</a:t>
             </a:fld>
             <a:endParaRPr lang="zh-CN" altLang="en-US"/>
           </a:p>
@@ -4377,7 +4377,7 @@
           <a:p>
             <a:fld id="{760FBDFE-C587-4B4C-A407-44438C67B59E}" type="datetimeFigureOut">
               <a:rPr lang="zh-CN" altLang="en-US" smtClean="0"/>
-              <a:t>2025/3/14</a:t>
+              <a:t>2025/3/26</a:t>
             </a:fld>
             <a:endParaRPr lang="zh-CN" altLang="en-US"/>
           </a:p>
@@ -4791,7 +4791,7 @@
           <a:p>
             <a:fld id="{760FBDFE-C587-4B4C-A407-44438C67B59E}" type="datetimeFigureOut">
               <a:rPr lang="zh-CN" altLang="en-US" smtClean="0"/>
-              <a:t>2025/3/14</a:t>
+              <a:t>2025/3/26</a:t>
             </a:fld>
             <a:endParaRPr lang="zh-CN" altLang="en-US"/>
           </a:p>
@@ -4923,7 +4923,7 @@
           <a:p>
             <a:fld id="{760FBDFE-C587-4B4C-A407-44438C67B59E}" type="datetimeFigureOut">
               <a:rPr lang="zh-CN" altLang="en-US" smtClean="0"/>
-              <a:t>2025/3/14</a:t>
+              <a:t>2025/3/26</a:t>
             </a:fld>
             <a:endParaRPr lang="zh-CN" altLang="en-US"/>
           </a:p>
@@ -5022,7 +5022,7 @@
           <a:p>
             <a:fld id="{760FBDFE-C587-4B4C-A407-44438C67B59E}" type="datetimeFigureOut">
               <a:rPr lang="zh-CN" altLang="en-US" smtClean="0"/>
-              <a:t>2025/3/14</a:t>
+              <a:t>2025/3/26</a:t>
             </a:fld>
             <a:endParaRPr lang="zh-CN" altLang="en-US"/>
           </a:p>
@@ -5194,7 +5194,7 @@
           <a:p>
             <a:fld id="{9EFD9D74-47D9-4702-A33C-335B63B48DBF}" type="datetimeFigureOut">
               <a:rPr lang="zh-CN" altLang="en-US" smtClean="0"/>
-              <a:t>2025/3/14</a:t>
+              <a:t>2025/3/26</a:t>
             </a:fld>
             <a:endParaRPr lang="zh-CN" altLang="en-US" dirty="0"/>
           </a:p>
@@ -5434,7 +5434,7 @@
           <a:p>
             <a:fld id="{760FBDFE-C587-4B4C-A407-44438C67B59E}" type="datetimeFigureOut">
               <a:rPr lang="zh-CN" altLang="en-US" smtClean="0"/>
-              <a:t>2025/3/14</a:t>
+              <a:t>2025/3/26</a:t>
             </a:fld>
             <a:endParaRPr lang="zh-CN" altLang="en-US"/>
           </a:p>
@@ -5660,7 +5660,7 @@
           <a:p>
             <a:fld id="{760FBDFE-C587-4B4C-A407-44438C67B59E}" type="datetimeFigureOut">
               <a:rPr lang="zh-CN" altLang="en-US" smtClean="0"/>
-              <a:t>2025/3/14</a:t>
+              <a:t>2025/3/26</a:t>
             </a:fld>
             <a:endParaRPr lang="zh-CN" altLang="en-US"/>
           </a:p>

</xml_diff>

<commit_message>
update exp2 and exp3
</commit_message>
<xml_diff>
--- a/4_Reports/2026_伍嘉琪_开题答辩_v2.pptx
+++ b/4_Reports/2026_伍嘉琪_开题答辩_v2.pptx
@@ -243,7 +243,7 @@
           <a:p>
             <a:fld id="{4198D4DD-46D5-4956-9054-BEF2F97ABAB0}" type="datetimeFigureOut">
               <a:rPr lang="zh-CN" altLang="en-US" smtClean="0"/>
-              <a:t>2025/3/26</a:t>
+              <a:t>2025/6/12</a:t>
             </a:fld>
             <a:endParaRPr lang="zh-CN" altLang="en-US"/>
           </a:p>
@@ -3335,7 +3335,7 @@
           <a:p>
             <a:fld id="{760FBDFE-C587-4B4C-A407-44438C67B59E}" type="datetimeFigureOut">
               <a:rPr lang="zh-CN" altLang="en-US" smtClean="0"/>
-              <a:t>2025/3/26</a:t>
+              <a:t>2025/6/12</a:t>
             </a:fld>
             <a:endParaRPr lang="zh-CN" altLang="en-US"/>
           </a:p>
@@ -3434,7 +3434,7 @@
           <a:p>
             <a:fld id="{760FBDFE-C587-4B4C-A407-44438C67B59E}" type="datetimeFigureOut">
               <a:rPr lang="zh-CN" altLang="en-US" smtClean="0"/>
-              <a:t>2025/3/26</a:t>
+              <a:t>2025/6/12</a:t>
             </a:fld>
             <a:endParaRPr lang="zh-CN" altLang="en-US"/>
           </a:p>
@@ -3592,7 +3592,7 @@
           <a:p>
             <a:fld id="{760FBDFE-C587-4B4C-A407-44438C67B59E}" type="datetimeFigureOut">
               <a:rPr lang="zh-CN" altLang="en-US" smtClean="0"/>
-              <a:t>2025/3/26</a:t>
+              <a:t>2025/6/12</a:t>
             </a:fld>
             <a:endParaRPr lang="zh-CN" altLang="en-US"/>
           </a:p>
@@ -3863,7 +3863,7 @@
           <a:p>
             <a:fld id="{760FBDFE-C587-4B4C-A407-44438C67B59E}" type="datetimeFigureOut">
               <a:rPr lang="zh-CN" altLang="en-US" smtClean="0"/>
-              <a:t>2025/3/26</a:t>
+              <a:t>2025/6/12</a:t>
             </a:fld>
             <a:endParaRPr lang="zh-CN" altLang="en-US"/>
           </a:p>
@@ -4123,7 +4123,7 @@
           <a:p>
             <a:fld id="{760FBDFE-C587-4B4C-A407-44438C67B59E}" type="datetimeFigureOut">
               <a:rPr lang="zh-CN" altLang="en-US" smtClean="0"/>
-              <a:t>2025/3/26</a:t>
+              <a:t>2025/6/12</a:t>
             </a:fld>
             <a:endParaRPr lang="zh-CN" altLang="en-US"/>
           </a:p>
@@ -4377,7 +4377,7 @@
           <a:p>
             <a:fld id="{760FBDFE-C587-4B4C-A407-44438C67B59E}" type="datetimeFigureOut">
               <a:rPr lang="zh-CN" altLang="en-US" smtClean="0"/>
-              <a:t>2025/3/26</a:t>
+              <a:t>2025/6/12</a:t>
             </a:fld>
             <a:endParaRPr lang="zh-CN" altLang="en-US"/>
           </a:p>
@@ -4791,7 +4791,7 @@
           <a:p>
             <a:fld id="{760FBDFE-C587-4B4C-A407-44438C67B59E}" type="datetimeFigureOut">
               <a:rPr lang="zh-CN" altLang="en-US" smtClean="0"/>
-              <a:t>2025/3/26</a:t>
+              <a:t>2025/6/12</a:t>
             </a:fld>
             <a:endParaRPr lang="zh-CN" altLang="en-US"/>
           </a:p>
@@ -4923,7 +4923,7 @@
           <a:p>
             <a:fld id="{760FBDFE-C587-4B4C-A407-44438C67B59E}" type="datetimeFigureOut">
               <a:rPr lang="zh-CN" altLang="en-US" smtClean="0"/>
-              <a:t>2025/3/26</a:t>
+              <a:t>2025/6/12</a:t>
             </a:fld>
             <a:endParaRPr lang="zh-CN" altLang="en-US"/>
           </a:p>
@@ -5022,7 +5022,7 @@
           <a:p>
             <a:fld id="{760FBDFE-C587-4B4C-A407-44438C67B59E}" type="datetimeFigureOut">
               <a:rPr lang="zh-CN" altLang="en-US" smtClean="0"/>
-              <a:t>2025/3/26</a:t>
+              <a:t>2025/6/12</a:t>
             </a:fld>
             <a:endParaRPr lang="zh-CN" altLang="en-US"/>
           </a:p>
@@ -5194,7 +5194,7 @@
           <a:p>
             <a:fld id="{9EFD9D74-47D9-4702-A33C-335B63B48DBF}" type="datetimeFigureOut">
               <a:rPr lang="zh-CN" altLang="en-US" smtClean="0"/>
-              <a:t>2025/3/26</a:t>
+              <a:t>2025/6/12</a:t>
             </a:fld>
             <a:endParaRPr lang="zh-CN" altLang="en-US" dirty="0"/>
           </a:p>
@@ -5434,7 +5434,7 @@
           <a:p>
             <a:fld id="{760FBDFE-C587-4B4C-A407-44438C67B59E}" type="datetimeFigureOut">
               <a:rPr lang="zh-CN" altLang="en-US" smtClean="0"/>
-              <a:t>2025/3/26</a:t>
+              <a:t>2025/6/12</a:t>
             </a:fld>
             <a:endParaRPr lang="zh-CN" altLang="en-US"/>
           </a:p>
@@ -5660,7 +5660,7 @@
           <a:p>
             <a:fld id="{760FBDFE-C587-4B4C-A407-44438C67B59E}" type="datetimeFigureOut">
               <a:rPr lang="zh-CN" altLang="en-US" smtClean="0"/>
-              <a:t>2025/3/26</a:t>
+              <a:t>2025/6/12</a:t>
             </a:fld>
             <a:endParaRPr lang="zh-CN" altLang="en-US"/>
           </a:p>

</xml_diff>